<commit_message>
Last Update 24-09-2018 20:22:18.91
</commit_message>
<xml_diff>
--- a/Slides/Unit 4/CS8392-U4-Generic Programing.pptx
+++ b/Slides/Unit 4/CS8392-U4-Generic Programing.pptx
@@ -207,7 +207,7 @@
             <a:fld id="{9515075B-F3F0-4441-A1BD-B7B515B708FF}" type="datetimeFigureOut">
               <a:rPr lang="en-US" smtClean="0"/>
               <a:pPr/>
-              <a:t>9/4/2018</a:t>
+              <a:t>9/24/2018</a:t>
             </a:fld>
             <a:endParaRPr lang="en-US"/>
           </a:p>
@@ -662,7 +662,7 @@
             <a:fld id="{6E658DF8-B8C0-4C7F-85EB-B53A2DDD44A9}" type="datetimeFigureOut">
               <a:rPr lang="en-US" smtClean="0"/>
               <a:pPr/>
-              <a:t>9/4/2018</a:t>
+              <a:t>9/24/2018</a:t>
             </a:fld>
             <a:endParaRPr lang="en-US"/>
           </a:p>
@@ -829,7 +829,7 @@
             <a:fld id="{6E658DF8-B8C0-4C7F-85EB-B53A2DDD44A9}" type="datetimeFigureOut">
               <a:rPr lang="en-US" smtClean="0"/>
               <a:pPr/>
-              <a:t>9/4/2018</a:t>
+              <a:t>9/24/2018</a:t>
             </a:fld>
             <a:endParaRPr lang="en-US"/>
           </a:p>
@@ -1006,7 +1006,7 @@
             <a:fld id="{6E658DF8-B8C0-4C7F-85EB-B53A2DDD44A9}" type="datetimeFigureOut">
               <a:rPr lang="en-US" smtClean="0"/>
               <a:pPr/>
-              <a:t>9/4/2018</a:t>
+              <a:t>9/24/2018</a:t>
             </a:fld>
             <a:endParaRPr lang="en-US"/>
           </a:p>
@@ -1205,7 +1205,7 @@
             <a:fld id="{6E658DF8-B8C0-4C7F-85EB-B53A2DDD44A9}" type="datetimeFigureOut">
               <a:rPr lang="en-US" smtClean="0"/>
               <a:pPr/>
-              <a:t>9/4/2018</a:t>
+              <a:t>9/24/2018</a:t>
             </a:fld>
             <a:endParaRPr lang="en-US"/>
           </a:p>
@@ -1448,7 +1448,7 @@
             <a:fld id="{6E658DF8-B8C0-4C7F-85EB-B53A2DDD44A9}" type="datetimeFigureOut">
               <a:rPr lang="en-US" smtClean="0"/>
               <a:pPr/>
-              <a:t>9/4/2018</a:t>
+              <a:t>9/24/2018</a:t>
             </a:fld>
             <a:endParaRPr lang="en-US"/>
           </a:p>
@@ -1733,7 +1733,7 @@
             <a:fld id="{6E658DF8-B8C0-4C7F-85EB-B53A2DDD44A9}" type="datetimeFigureOut">
               <a:rPr lang="en-US" smtClean="0"/>
               <a:pPr/>
-              <a:t>9/4/2018</a:t>
+              <a:t>9/24/2018</a:t>
             </a:fld>
             <a:endParaRPr lang="en-US"/>
           </a:p>
@@ -2152,7 +2152,7 @@
             <a:fld id="{6E658DF8-B8C0-4C7F-85EB-B53A2DDD44A9}" type="datetimeFigureOut">
               <a:rPr lang="en-US" smtClean="0"/>
               <a:pPr/>
-              <a:t>9/4/2018</a:t>
+              <a:t>9/24/2018</a:t>
             </a:fld>
             <a:endParaRPr lang="en-US"/>
           </a:p>
@@ -2267,7 +2267,7 @@
             <a:fld id="{6E658DF8-B8C0-4C7F-85EB-B53A2DDD44A9}" type="datetimeFigureOut">
               <a:rPr lang="en-US" smtClean="0"/>
               <a:pPr/>
-              <a:t>9/4/2018</a:t>
+              <a:t>9/24/2018</a:t>
             </a:fld>
             <a:endParaRPr lang="en-US"/>
           </a:p>
@@ -2359,7 +2359,7 @@
             <a:fld id="{6E658DF8-B8C0-4C7F-85EB-B53A2DDD44A9}" type="datetimeFigureOut">
               <a:rPr lang="en-US" smtClean="0"/>
               <a:pPr/>
-              <a:t>9/4/2018</a:t>
+              <a:t>9/24/2018</a:t>
             </a:fld>
             <a:endParaRPr lang="en-US"/>
           </a:p>
@@ -2633,7 +2633,7 @@
             <a:fld id="{6E658DF8-B8C0-4C7F-85EB-B53A2DDD44A9}" type="datetimeFigureOut">
               <a:rPr lang="en-US" smtClean="0"/>
               <a:pPr/>
-              <a:t>9/4/2018</a:t>
+              <a:t>9/24/2018</a:t>
             </a:fld>
             <a:endParaRPr lang="en-US"/>
           </a:p>
@@ -2883,7 +2883,7 @@
             <a:fld id="{6E658DF8-B8C0-4C7F-85EB-B53A2DDD44A9}" type="datetimeFigureOut">
               <a:rPr lang="en-US" smtClean="0"/>
               <a:pPr/>
-              <a:t>9/4/2018</a:t>
+              <a:t>9/24/2018</a:t>
             </a:fld>
             <a:endParaRPr lang="en-US"/>
           </a:p>
@@ -3099,7 +3099,7 @@
             <a:fld id="{6E658DF8-B8C0-4C7F-85EB-B53A2DDD44A9}" type="datetimeFigureOut">
               <a:rPr lang="en-US" smtClean="0"/>
               <a:pPr/>
-              <a:t>9/4/2018</a:t>
+              <a:t>9/24/2018</a:t>
             </a:fld>
             <a:endParaRPr lang="en-US"/>
           </a:p>
@@ -3494,11 +3494,7 @@
           <a:p>
             <a:r>
               <a:rPr lang="en-US" dirty="0" smtClean="0"/>
-              <a:t>Generic </a:t>
-            </a:r>
-            <a:r>
-              <a:rPr lang="en-US" dirty="0" smtClean="0"/>
-              <a:t>Programming</a:t>
+              <a:t>Generic Programming</a:t>
             </a:r>
             <a:endParaRPr lang="en-US" dirty="0"/>
           </a:p>
@@ -4104,17 +4100,8 @@
           <a:p>
             <a:r>
               <a:rPr lang="en-US" dirty="0" smtClean="0"/>
-              <a:t>Cannot Instantiate Generic Types with </a:t>
-            </a:r>
-            <a:r>
-              <a:rPr lang="en-US" smtClean="0"/>
-              <a:t>Primitive </a:t>
-            </a:r>
-            <a:r>
-              <a:rPr lang="en-US" smtClean="0"/>
-              <a:t>Types</a:t>
-            </a:r>
-            <a:endParaRPr lang="en-US" dirty="0" smtClean="0"/>
+              <a:t>Cannot Instantiate Generic Types with Primitive Types</a:t>
+            </a:r>
           </a:p>
           <a:p>
             <a:r>
@@ -4139,13 +4126,8 @@
             </a:r>
             <a:r>
               <a:rPr lang="en-US" dirty="0" smtClean="0"/>
-              <a:t> with Parameterized </a:t>
-            </a:r>
-            <a:r>
-              <a:rPr lang="en-US" dirty="0" smtClean="0"/>
-              <a:t>Types</a:t>
-            </a:r>
-            <a:endParaRPr lang="en-US" dirty="0" smtClean="0"/>
+              <a:t> with Parameterized Types</a:t>
+            </a:r>
           </a:p>
         </p:txBody>
       </p:sp>
@@ -4214,11 +4196,7 @@
           <a:p>
             <a:r>
               <a:rPr lang="en-US" dirty="0" smtClean="0"/>
-              <a:t>Cannot Create Arrays of Parameterized </a:t>
-            </a:r>
-            <a:r>
-              <a:rPr lang="en-US" dirty="0" smtClean="0"/>
-              <a:t>Types</a:t>
+              <a:t>Cannot Create Arrays of Parameterized Types</a:t>
             </a:r>
           </a:p>
           <a:p>
@@ -4230,13 +4208,8 @@
           <a:p>
             <a:r>
               <a:rPr lang="en-US" dirty="0" smtClean="0"/>
-              <a:t>Cannot Overload a Method Where the Formal Parameter Types of Each Overload Erase to the Same Raw </a:t>
-            </a:r>
-            <a:r>
-              <a:rPr lang="en-US" dirty="0" smtClean="0"/>
-              <a:t>Type</a:t>
-            </a:r>
-            <a:endParaRPr lang="en-US" dirty="0" smtClean="0"/>
+              <a:t>Cannot Overload a Method Where the Formal Parameter Types of Each Overload Erase to the Same Raw Type</a:t>
+            </a:r>
           </a:p>
         </p:txBody>
       </p:sp>
@@ -4683,11 +4656,7 @@
           <a:p>
             <a:r>
               <a:rPr lang="en-IN" dirty="0" smtClean="0"/>
-              <a:t>Generics help us to write program </a:t>
-            </a:r>
-            <a:r>
-              <a:rPr lang="en-IN" dirty="0" smtClean="0"/>
-              <a:t>that independent of data types.</a:t>
+              <a:t>Generics help us to write program that independent of data types.</a:t>
             </a:r>
           </a:p>
           <a:p>
@@ -4783,22 +4752,13 @@
           <a:p>
             <a:r>
               <a:rPr lang="en-US" dirty="0" smtClean="0"/>
-              <a:t>We can </a:t>
-            </a:r>
+              <a:t>We can write a single generic method declaration that can be called with arguments of different types. </a:t>
+            </a:r>
+          </a:p>
+          <a:p>
             <a:r>
               <a:rPr lang="en-US" dirty="0" smtClean="0"/>
-              <a:t>write a single generic method declaration that can be called with arguments of different types. </a:t>
-            </a:r>
-            <a:endParaRPr lang="en-US" dirty="0" smtClean="0"/>
-          </a:p>
-          <a:p>
-            <a:r>
-              <a:rPr lang="en-US" dirty="0" smtClean="0"/>
-              <a:t>Based </a:t>
-            </a:r>
-            <a:r>
-              <a:rPr lang="en-US" dirty="0" smtClean="0"/>
-              <a:t>on the types of the arguments passed to the generic method, the compiler handles each method call appropriately. </a:t>
+              <a:t>Based on the types of the arguments passed to the generic method, the compiler handles each method call appropriately. </a:t>
             </a:r>
             <a:endParaRPr lang="en-US" dirty="0"/>
           </a:p>
@@ -4897,13 +4857,8 @@
             </a:r>
             <a:r>
               <a:rPr lang="en-US" dirty="0" smtClean="0"/>
-              <a:t>, double and char</a:t>
-            </a:r>
-            <a:r>
-              <a:rPr lang="en-US" dirty="0" smtClean="0"/>
-              <a:t>).</a:t>
-            </a:r>
-            <a:endParaRPr lang="en-US" dirty="0" smtClean="0"/>
+              <a:t>, double and char).</a:t>
+            </a:r>
           </a:p>
         </p:txBody>
       </p:sp>

</xml_diff>